<commit_message>
exported ppt to pdf
</commit_message>
<xml_diff>
--- a/IOT.pptx
+++ b/IOT.pptx
@@ -7625,7 +7625,7 @@
         </p:spPr>
         <p:txBody>
           <a:bodyPr>
-            <a:normAutofit lnSpcReduction="10000"/>
+            <a:normAutofit fontScale="92500" lnSpcReduction="20000"/>
           </a:bodyPr>
           <a:lstStyle/>
           <a:p>
@@ -7688,6 +7688,13 @@
             <a:r>
               <a:rPr lang="en-US" sz="2400" dirty="0"/>
               <a:t>Somewhere in the cloud</a:t>
+            </a:r>
+          </a:p>
+          <a:p>
+            <a:pPr lvl="1"/>
+            <a:r>
+              <a:rPr lang="en-US" sz="2400" dirty="0"/>
+              <a:t>Lots of vendors</a:t>
             </a:r>
           </a:p>
           <a:p>
@@ -7724,7 +7731,7 @@
         </p:blipFill>
         <p:spPr bwMode="auto">
           <a:xfrm>
-            <a:off x="7351309" y="495299"/>
+            <a:off x="7202919" y="1313447"/>
             <a:ext cx="3973489" cy="2225154"/>
           </a:xfrm>
           <a:prstGeom prst="rect">

</xml_diff>